<commit_message>
Update The Mystic Rescue GDR.pptx
</commit_message>
<xml_diff>
--- a/Assets/Docs/The Mystic Rescue GDR.pptx
+++ b/Assets/Docs/The Mystic Rescue GDR.pptx
@@ -256,7 +256,7 @@
       <p15:sldGuideLst xmlns:p15="http://schemas.microsoft.com/office/powerpoint/2012/main"/>
     </p:ext>
     <p:ext uri="http://customooxmlschemas.google.com/">
-      <go:slidesCustomData xmlns:mc="http://schemas.openxmlformats.org/markup-compatibility/2006" xmlns:mv="urn:schemas-microsoft-com:mac:vml" xmlns:c="http://schemas.openxmlformats.org/drawingml/2006/chart" xmlns:dgm="http://schemas.openxmlformats.org/drawingml/2006/diagram" xmlns:o="urn:schemas-microsoft-com:office:office" xmlns:v="urn:schemas-microsoft-com:vml" xmlns:pvml="urn:schemas-microsoft-com:office:powerpoint" xmlns:com="http://schemas.openxmlformats.org/drawingml/2006/compatibility" xmlns:p14="http://schemas.microsoft.com/office/powerpoint/2010/main" xmlns:p15="http://schemas.microsoft.com/office/powerpoint/2012/main" xmlns:ahyp="http://schemas.microsoft.com/office/drawing/2018/hyperlinkcolor" xmlns:go="http://customooxmlschemas.google.com/" xmlns="" r:id="rId17" roundtripDataSignature="AMtx7mhCnmjakt+2bM7Dg5EJE5FT4J0igA=="/>
+      <go:slidesCustomData xmlns="" xmlns:go="http://customooxmlschemas.google.com/" xmlns:ahyp="http://schemas.microsoft.com/office/drawing/2018/hyperlinkcolor" xmlns:p15="http://schemas.microsoft.com/office/powerpoint/2012/main" xmlns:p14="http://schemas.microsoft.com/office/powerpoint/2010/main" xmlns:com="http://schemas.openxmlformats.org/drawingml/2006/compatibility" xmlns:pvml="urn:schemas-microsoft-com:office:powerpoint" xmlns:v="urn:schemas-microsoft-com:vml" xmlns:o="urn:schemas-microsoft-com:office:office" xmlns:dgm="http://schemas.openxmlformats.org/drawingml/2006/diagram" xmlns:c="http://schemas.openxmlformats.org/drawingml/2006/chart" xmlns:mv="urn:schemas-microsoft-com:mac:vml" xmlns:mc="http://schemas.openxmlformats.org/markup-compatibility/2006" r:id="rId17" roundtripDataSignature="AMtx7mhCnmjakt+2bM7Dg5EJE5FT4J0igA=="/>
     </p:ext>
   </p:extLst>
 </p:presentation>
@@ -14274,39 +14274,7 @@
               </a:spcAft>
               <a:buNone/>
             </a:pPr>
-            <a:r>
-              <a:rPr lang="en-US" sz="6000" b="0" i="0" u="none" strike="noStrike" cap="none">
-                <a:solidFill>
-                  <a:srgbClr val="000000"/>
-                </a:solidFill>
-                <a:latin typeface="Calibri"/>
-                <a:ea typeface="Calibri"/>
-                <a:cs typeface="Calibri"/>
-                <a:sym typeface="Calibri"/>
-              </a:rPr>
-              <a:t>The Mystic Rescue</a:t>
-            </a:r>
-            <a:br>
-              <a:rPr lang="en-US" sz="1800" b="0" i="0" u="none" strike="noStrike" cap="none">
-                <a:latin typeface="Arial"/>
-                <a:ea typeface="Arial"/>
-                <a:cs typeface="Arial"/>
-                <a:sym typeface="Arial"/>
-              </a:rPr>
-            </a:br>
-            <a:r>
-              <a:rPr lang="en-US" sz="6000" b="0" i="0" u="none" strike="noStrike" cap="none">
-                <a:solidFill>
-                  <a:srgbClr val="000000"/>
-                </a:solidFill>
-                <a:latin typeface="Calibri"/>
-                <a:ea typeface="Calibri"/>
-                <a:cs typeface="Calibri"/>
-                <a:sym typeface="Calibri"/>
-              </a:rPr>
-              <a:t>Game Design Review</a:t>
-            </a:r>
-            <a:endParaRPr sz="6000" b="0" i="0" u="none" strike="noStrike" cap="none">
+            <a:endParaRPr sz="6000" b="0" i="0" u="none" strike="noStrike" cap="none" dirty="0">
               <a:latin typeface="Arial"/>
               <a:ea typeface="Arial"/>
               <a:cs typeface="Arial"/>
@@ -14323,7 +14291,7 @@
         </p:nvSpPr>
         <p:spPr>
           <a:xfrm>
-            <a:off x="1523880" y="4663440"/>
+            <a:off x="1523880" y="4589280"/>
             <a:ext cx="9142560" cy="1146240"/>
           </a:xfrm>
           <a:prstGeom prst="rect">
@@ -14352,451 +14320,7 @@
               </a:spcAft>
               <a:buNone/>
             </a:pPr>
-            <a:r>
-              <a:rPr lang="en-US" sz="2400" b="0" i="0" u="none" strike="noStrike" cap="none">
-                <a:solidFill>
-                  <a:srgbClr val="FF0000"/>
-                </a:solidFill>
-                <a:latin typeface="Calibri"/>
-                <a:ea typeface="Calibri"/>
-                <a:cs typeface="Calibri"/>
-                <a:sym typeface="Calibri"/>
-              </a:rPr>
-              <a:t>(</a:t>
-            </a:r>
-            <a:r>
-              <a:rPr lang="en-US" sz="2400" b="0" i="0" u="none" strike="noStrike" cap="none" err="1">
-                <a:solidFill>
-                  <a:srgbClr val="FF0000"/>
-                </a:solidFill>
-                <a:latin typeface="Calibri"/>
-                <a:ea typeface="Calibri"/>
-                <a:cs typeface="Calibri"/>
-                <a:sym typeface="Calibri"/>
-              </a:rPr>
-              <a:t>pode</a:t>
-            </a:r>
-            <a:r>
-              <a:rPr lang="en-US" sz="2400" b="0" i="0" u="none" strike="noStrike" cap="none">
-                <a:solidFill>
-                  <a:srgbClr val="FF0000"/>
-                </a:solidFill>
-                <a:latin typeface="Calibri"/>
-                <a:ea typeface="Calibri"/>
-                <a:cs typeface="Calibri"/>
-                <a:sym typeface="Calibri"/>
-              </a:rPr>
-              <a:t> ser </a:t>
-            </a:r>
-            <a:r>
-              <a:rPr lang="en-US" sz="2400" b="0" i="0" u="none" strike="noStrike" cap="none" err="1">
-                <a:solidFill>
-                  <a:srgbClr val="FF0000"/>
-                </a:solidFill>
-                <a:latin typeface="Calibri"/>
-                <a:ea typeface="Calibri"/>
-                <a:cs typeface="Calibri"/>
-                <a:sym typeface="Calibri"/>
-              </a:rPr>
-              <a:t>uma</a:t>
-            </a:r>
-            <a:r>
-              <a:rPr lang="en-US" sz="2400" b="0" i="0" u="none" strike="noStrike" cap="none">
-                <a:solidFill>
-                  <a:srgbClr val="FF0000"/>
-                </a:solidFill>
-                <a:latin typeface="Calibri"/>
-                <a:ea typeface="Calibri"/>
-                <a:cs typeface="Calibri"/>
-                <a:sym typeface="Calibri"/>
-              </a:rPr>
-              <a:t> logo </a:t>
-            </a:r>
-            <a:r>
-              <a:rPr lang="en-US" sz="2400" b="0" i="0" u="none" strike="noStrike" cap="none" err="1">
-                <a:solidFill>
-                  <a:srgbClr val="FF0000"/>
-                </a:solidFill>
-                <a:latin typeface="Calibri"/>
-                <a:ea typeface="Calibri"/>
-                <a:cs typeface="Calibri"/>
-                <a:sym typeface="Calibri"/>
-              </a:rPr>
-              <a:t>temporária</a:t>
-            </a:r>
-            <a:r>
-              <a:rPr lang="en-US" sz="2400" b="0" i="0" u="none" strike="noStrike" cap="none">
-                <a:solidFill>
-                  <a:srgbClr val="FF0000"/>
-                </a:solidFill>
-                <a:latin typeface="Calibri"/>
-                <a:ea typeface="Calibri"/>
-                <a:cs typeface="Calibri"/>
-                <a:sym typeface="Calibri"/>
-              </a:rPr>
-              <a:t>, mas algo que </a:t>
-            </a:r>
-            <a:r>
-              <a:rPr lang="en-US" sz="2400" b="0" i="0" u="none" strike="noStrike" cap="none" err="1">
-                <a:solidFill>
-                  <a:srgbClr val="FF0000"/>
-                </a:solidFill>
-                <a:latin typeface="Calibri"/>
-                <a:ea typeface="Calibri"/>
-                <a:cs typeface="Calibri"/>
-                <a:sym typeface="Calibri"/>
-              </a:rPr>
-              <a:t>indique</a:t>
-            </a:r>
-            <a:r>
-              <a:rPr lang="en-US" sz="2400" b="0" i="0" u="none" strike="noStrike" cap="none">
-                <a:solidFill>
-                  <a:srgbClr val="FF0000"/>
-                </a:solidFill>
-                <a:latin typeface="Calibri"/>
-                <a:ea typeface="Calibri"/>
-                <a:cs typeface="Calibri"/>
-                <a:sym typeface="Calibri"/>
-              </a:rPr>
-              <a:t> o design visual do </a:t>
-            </a:r>
-            <a:r>
-              <a:rPr lang="en-US" sz="2400" b="0" i="0" u="none" strike="noStrike" cap="none" err="1">
-                <a:solidFill>
-                  <a:srgbClr val="FF0000"/>
-                </a:solidFill>
-                <a:latin typeface="Calibri"/>
-                <a:ea typeface="Calibri"/>
-                <a:cs typeface="Calibri"/>
-                <a:sym typeface="Calibri"/>
-              </a:rPr>
-              <a:t>jogo</a:t>
-            </a:r>
-            <a:r>
-              <a:rPr lang="en-US" sz="2400" b="0" i="0" u="none" strike="noStrike" cap="none">
-                <a:solidFill>
-                  <a:srgbClr val="FF0000"/>
-                </a:solidFill>
-                <a:latin typeface="Calibri"/>
-                <a:ea typeface="Calibri"/>
-                <a:cs typeface="Calibri"/>
-                <a:sym typeface="Calibri"/>
-              </a:rPr>
-              <a:t> – </a:t>
-            </a:r>
-            <a:r>
-              <a:rPr lang="en-US" sz="2400" b="0" i="0" u="none" strike="noStrike" cap="none" err="1">
-                <a:solidFill>
-                  <a:srgbClr val="FF0000"/>
-                </a:solidFill>
-                <a:latin typeface="Calibri"/>
-                <a:ea typeface="Calibri"/>
-                <a:cs typeface="Calibri"/>
-                <a:sym typeface="Calibri"/>
-              </a:rPr>
-              <a:t>pode</a:t>
-            </a:r>
-            <a:r>
-              <a:rPr lang="en-US" sz="2400" b="0" i="0" u="none" strike="noStrike" cap="none">
-                <a:solidFill>
-                  <a:srgbClr val="FF0000"/>
-                </a:solidFill>
-                <a:latin typeface="Calibri"/>
-                <a:ea typeface="Calibri"/>
-                <a:cs typeface="Calibri"/>
-                <a:sym typeface="Calibri"/>
-              </a:rPr>
-              <a:t>-se </a:t>
-            </a:r>
-            <a:r>
-              <a:rPr lang="en-US" sz="2400" b="0" i="0" u="none" strike="noStrike" cap="none" err="1">
-                <a:solidFill>
-                  <a:srgbClr val="FF0000"/>
-                </a:solidFill>
-                <a:latin typeface="Calibri"/>
-                <a:ea typeface="Calibri"/>
-                <a:cs typeface="Calibri"/>
-                <a:sym typeface="Calibri"/>
-              </a:rPr>
-              <a:t>também</a:t>
-            </a:r>
-            <a:r>
-              <a:rPr lang="en-US" sz="2400" b="0" i="0" u="none" strike="noStrike" cap="none">
-                <a:solidFill>
-                  <a:srgbClr val="FF0000"/>
-                </a:solidFill>
-                <a:latin typeface="Calibri"/>
-                <a:ea typeface="Calibri"/>
-                <a:cs typeface="Calibri"/>
-                <a:sym typeface="Calibri"/>
-              </a:rPr>
-              <a:t> ser </a:t>
-            </a:r>
-            <a:r>
-              <a:rPr lang="en-US" sz="2400" b="0" i="0" u="none" strike="noStrike" cap="none" err="1">
-                <a:solidFill>
-                  <a:srgbClr val="FF0000"/>
-                </a:solidFill>
-                <a:latin typeface="Calibri"/>
-                <a:ea typeface="Calibri"/>
-                <a:cs typeface="Calibri"/>
-                <a:sym typeface="Calibri"/>
-              </a:rPr>
-              <a:t>colocado</a:t>
-            </a:r>
-            <a:r>
-              <a:rPr lang="en-US" sz="2400" b="0" i="0" u="none" strike="noStrike" cap="none">
-                <a:solidFill>
-                  <a:srgbClr val="FF0000"/>
-                </a:solidFill>
-                <a:latin typeface="Calibri"/>
-                <a:ea typeface="Calibri"/>
-                <a:cs typeface="Calibri"/>
-                <a:sym typeface="Calibri"/>
-              </a:rPr>
-              <a:t> </a:t>
-            </a:r>
-            <a:r>
-              <a:rPr lang="en-US" sz="2400" b="0" i="0" u="none" strike="noStrike" cap="none" err="1">
-                <a:solidFill>
-                  <a:srgbClr val="FF0000"/>
-                </a:solidFill>
-                <a:latin typeface="Calibri"/>
-                <a:ea typeface="Calibri"/>
-                <a:cs typeface="Calibri"/>
-                <a:sym typeface="Calibri"/>
-              </a:rPr>
-              <a:t>apenas</a:t>
-            </a:r>
-            <a:r>
-              <a:rPr lang="en-US" sz="2400" b="0" i="0" u="none" strike="noStrike" cap="none">
-                <a:solidFill>
-                  <a:srgbClr val="FF0000"/>
-                </a:solidFill>
-                <a:latin typeface="Calibri"/>
-                <a:ea typeface="Calibri"/>
-                <a:cs typeface="Calibri"/>
-                <a:sym typeface="Calibri"/>
-              </a:rPr>
-              <a:t> o </a:t>
-            </a:r>
-            <a:r>
-              <a:rPr lang="en-US" sz="2400" b="0" i="0" u="none" strike="noStrike" cap="none" err="1">
-                <a:solidFill>
-                  <a:srgbClr val="FF0000"/>
-                </a:solidFill>
-                <a:latin typeface="Calibri"/>
-                <a:ea typeface="Calibri"/>
-                <a:cs typeface="Calibri"/>
-                <a:sym typeface="Calibri"/>
-              </a:rPr>
-              <a:t>título</a:t>
-            </a:r>
-            <a:r>
-              <a:rPr lang="en-US" sz="2400" b="0" i="0" u="none" strike="noStrike" cap="none">
-                <a:solidFill>
-                  <a:srgbClr val="FF0000"/>
-                </a:solidFill>
-                <a:latin typeface="Calibri"/>
-                <a:ea typeface="Calibri"/>
-                <a:cs typeface="Calibri"/>
-                <a:sym typeface="Calibri"/>
-              </a:rPr>
-              <a:t> </a:t>
-            </a:r>
-            <a:r>
-              <a:rPr lang="en-US" sz="2400" b="0" i="0" u="none" strike="noStrike" cap="none" err="1">
-                <a:solidFill>
-                  <a:srgbClr val="FF0000"/>
-                </a:solidFill>
-                <a:latin typeface="Calibri"/>
-                <a:ea typeface="Calibri"/>
-                <a:cs typeface="Calibri"/>
-                <a:sym typeface="Calibri"/>
-              </a:rPr>
-              <a:t>temporário</a:t>
-            </a:r>
-            <a:r>
-              <a:rPr lang="en-US" sz="2400" b="0" i="0" u="none" strike="noStrike" cap="none">
-                <a:solidFill>
-                  <a:srgbClr val="FF0000"/>
-                </a:solidFill>
-                <a:latin typeface="Calibri"/>
-                <a:ea typeface="Calibri"/>
-                <a:cs typeface="Calibri"/>
-                <a:sym typeface="Calibri"/>
-              </a:rPr>
-              <a:t>, </a:t>
-            </a:r>
-            <a:r>
-              <a:rPr lang="en-US" sz="2400" b="0" i="0" u="none" strike="noStrike" cap="none" err="1">
-                <a:solidFill>
-                  <a:srgbClr val="FF0000"/>
-                </a:solidFill>
-                <a:latin typeface="Calibri"/>
-                <a:ea typeface="Calibri"/>
-                <a:cs typeface="Calibri"/>
-                <a:sym typeface="Calibri"/>
-              </a:rPr>
-              <a:t>caso</a:t>
-            </a:r>
-            <a:r>
-              <a:rPr lang="en-US" sz="2400" b="0" i="0" u="none" strike="noStrike" cap="none">
-                <a:solidFill>
-                  <a:srgbClr val="FF0000"/>
-                </a:solidFill>
-                <a:latin typeface="Calibri"/>
-                <a:ea typeface="Calibri"/>
-                <a:cs typeface="Calibri"/>
-                <a:sym typeface="Calibri"/>
-              </a:rPr>
-              <a:t> o visual/</a:t>
-            </a:r>
-            <a:r>
-              <a:rPr lang="en-US" sz="2400" b="0" i="0" u="none" strike="noStrike" cap="none" err="1">
-                <a:solidFill>
-                  <a:srgbClr val="FF0000"/>
-                </a:solidFill>
-                <a:latin typeface="Calibri"/>
-                <a:ea typeface="Calibri"/>
-                <a:cs typeface="Calibri"/>
-                <a:sym typeface="Calibri"/>
-              </a:rPr>
-              <a:t>título</a:t>
-            </a:r>
-            <a:r>
-              <a:rPr lang="en-US" sz="2400" b="0" i="0" u="none" strike="noStrike" cap="none">
-                <a:solidFill>
-                  <a:srgbClr val="FF0000"/>
-                </a:solidFill>
-                <a:latin typeface="Calibri"/>
-                <a:ea typeface="Calibri"/>
-                <a:cs typeface="Calibri"/>
-                <a:sym typeface="Calibri"/>
-              </a:rPr>
-              <a:t> </a:t>
-            </a:r>
-            <a:r>
-              <a:rPr lang="en-US" sz="2400" b="0" i="0" u="none" strike="noStrike" cap="none" err="1">
-                <a:solidFill>
-                  <a:srgbClr val="FF0000"/>
-                </a:solidFill>
-                <a:latin typeface="Calibri"/>
-                <a:ea typeface="Calibri"/>
-                <a:cs typeface="Calibri"/>
-                <a:sym typeface="Calibri"/>
-              </a:rPr>
-              <a:t>ainda</a:t>
-            </a:r>
-            <a:r>
-              <a:rPr lang="en-US" sz="2400" b="0" i="0" u="none" strike="noStrike" cap="none">
-                <a:solidFill>
-                  <a:srgbClr val="FF0000"/>
-                </a:solidFill>
-                <a:latin typeface="Calibri"/>
-                <a:ea typeface="Calibri"/>
-                <a:cs typeface="Calibri"/>
-                <a:sym typeface="Calibri"/>
-              </a:rPr>
-              <a:t> </a:t>
-            </a:r>
-            <a:r>
-              <a:rPr lang="en-US" sz="2400" b="0" i="0" u="none" strike="noStrike" cap="none" err="1">
-                <a:solidFill>
-                  <a:srgbClr val="FF0000"/>
-                </a:solidFill>
-                <a:latin typeface="Calibri"/>
-                <a:ea typeface="Calibri"/>
-                <a:cs typeface="Calibri"/>
-                <a:sym typeface="Calibri"/>
-              </a:rPr>
-              <a:t>não</a:t>
-            </a:r>
-            <a:r>
-              <a:rPr lang="en-US" sz="2400" b="0" i="0" u="none" strike="noStrike" cap="none">
-                <a:solidFill>
-                  <a:srgbClr val="FF0000"/>
-                </a:solidFill>
-                <a:latin typeface="Calibri"/>
-                <a:ea typeface="Calibri"/>
-                <a:cs typeface="Calibri"/>
-                <a:sym typeface="Calibri"/>
-              </a:rPr>
-              <a:t> </a:t>
-            </a:r>
-            <a:r>
-              <a:rPr lang="en-US" sz="2400" b="0" i="0" u="none" strike="noStrike" cap="none" err="1">
-                <a:solidFill>
-                  <a:srgbClr val="FF0000"/>
-                </a:solidFill>
-                <a:latin typeface="Calibri"/>
-                <a:ea typeface="Calibri"/>
-                <a:cs typeface="Calibri"/>
-                <a:sym typeface="Calibri"/>
-              </a:rPr>
-              <a:t>tenha</a:t>
-            </a:r>
-            <a:r>
-              <a:rPr lang="en-US" sz="2400" b="0" i="0" u="none" strike="noStrike" cap="none">
-                <a:solidFill>
-                  <a:srgbClr val="FF0000"/>
-                </a:solidFill>
-                <a:latin typeface="Calibri"/>
-                <a:ea typeface="Calibri"/>
-                <a:cs typeface="Calibri"/>
-                <a:sym typeface="Calibri"/>
-              </a:rPr>
-              <a:t> </a:t>
-            </a:r>
-            <a:r>
-              <a:rPr lang="en-US" sz="2400" b="0" i="0" u="none" strike="noStrike" cap="none" err="1">
-                <a:solidFill>
-                  <a:srgbClr val="FF0000"/>
-                </a:solidFill>
-                <a:latin typeface="Calibri"/>
-                <a:ea typeface="Calibri"/>
-                <a:cs typeface="Calibri"/>
-                <a:sym typeface="Calibri"/>
-              </a:rPr>
-              <a:t>sido</a:t>
-            </a:r>
-            <a:r>
-              <a:rPr lang="en-US" sz="2400" b="0" i="0" u="none" strike="noStrike" cap="none">
-                <a:solidFill>
-                  <a:srgbClr val="FF0000"/>
-                </a:solidFill>
-                <a:latin typeface="Calibri"/>
-                <a:ea typeface="Calibri"/>
-                <a:cs typeface="Calibri"/>
-                <a:sym typeface="Calibri"/>
-              </a:rPr>
-              <a:t> </a:t>
-            </a:r>
-            <a:r>
-              <a:rPr lang="en-US" sz="2400" b="0" i="0" u="none" strike="noStrike" cap="none" err="1">
-                <a:solidFill>
-                  <a:srgbClr val="FF0000"/>
-                </a:solidFill>
-                <a:latin typeface="Calibri"/>
-                <a:ea typeface="Calibri"/>
-                <a:cs typeface="Calibri"/>
-                <a:sym typeface="Calibri"/>
-              </a:rPr>
-              <a:t>decidido</a:t>
-            </a:r>
-            <a:r>
-              <a:rPr lang="en-US" sz="2400" b="0" i="0" u="none" strike="noStrike" cap="none">
-                <a:solidFill>
-                  <a:srgbClr val="FF0000"/>
-                </a:solidFill>
-                <a:latin typeface="Calibri"/>
-                <a:ea typeface="Calibri"/>
-                <a:cs typeface="Calibri"/>
-                <a:sym typeface="Calibri"/>
-              </a:rPr>
-              <a:t>.</a:t>
-            </a:r>
-            <a:endParaRPr sz="2400" b="0" i="0" u="none" strike="noStrike" cap="none">
+            <a:endParaRPr sz="2400" b="0" i="0" u="none" strike="noStrike" cap="none" dirty="0">
               <a:solidFill>
                 <a:srgbClr val="FF0000"/>
               </a:solidFill>
@@ -14845,15 +14369,6 @@
               </a:spcAft>
               <a:buNone/>
             </a:pPr>
-            <a:r>
-              <a:rPr lang="pt-BR" sz="2400" dirty="0">
-                <a:latin typeface="+mn-lt"/>
-                <a:ea typeface="Courier"/>
-                <a:cs typeface="Courier"/>
-                <a:sym typeface="Courier"/>
-              </a:rPr>
-              <a:t>Maycon Ricardo de Freitas, Rafael Araújo Glória, Silvia Freitas de Almeida.</a:t>
-            </a:r>
             <a:endParaRPr sz="2400" b="0" i="0" u="none" strike="noStrike" cap="none" dirty="0">
               <a:latin typeface="Arial"/>
               <a:ea typeface="Arial"/>
@@ -14863,6 +14378,36 @@
           </a:p>
         </p:txBody>
       </p:sp>
+      <p:pic>
+        <p:nvPicPr>
+          <p:cNvPr id="4" name="Imagem 3">
+            <a:extLst>
+              <a:ext uri="{FF2B5EF4-FFF2-40B4-BE49-F238E27FC236}">
+                <a16:creationId xmlns:a16="http://schemas.microsoft.com/office/drawing/2014/main" id="{2BF7A85F-890A-9F5F-F5F7-7397292901BE}"/>
+              </a:ext>
+            </a:extLst>
+          </p:cNvPr>
+          <p:cNvPicPr>
+            <a:picLocks noChangeAspect="1"/>
+          </p:cNvPicPr>
+          <p:nvPr/>
+        </p:nvPicPr>
+        <p:blipFill>
+          <a:blip r:embed="rId3"/>
+          <a:stretch>
+            <a:fillRect/>
+          </a:stretch>
+        </p:blipFill>
+        <p:spPr>
+          <a:xfrm>
+            <a:off x="0" y="0"/>
+            <a:ext cx="12192000" cy="6858000"/>
+          </a:xfrm>
+          <a:prstGeom prst="rect">
+            <a:avLst/>
+          </a:prstGeom>
+        </p:spPr>
+      </p:pic>
     </p:spTree>
   </p:cSld>
   <p:clrMapOvr>
@@ -15691,6 +15236,14 @@
 <file path=ppt/slides/slide2.xml><?xml version="1.0" encoding="utf-8"?>
 <p:sld xmlns:a="http://schemas.openxmlformats.org/drawingml/2006/main" xmlns:r="http://schemas.openxmlformats.org/officeDocument/2006/relationships" xmlns:p="http://schemas.openxmlformats.org/presentationml/2006/main">
   <p:cSld>
+    <p:bg>
+      <p:bgPr>
+        <a:solidFill>
+          <a:srgbClr val="FFFFFF"/>
+        </a:solidFill>
+        <a:effectLst/>
+      </p:bgPr>
+    </p:bg>
     <p:spTree>
       <p:nvGrpSpPr>
         <p:cNvPr id="1" name="Shape 117"/>
@@ -15705,6 +15258,58 @@
           <a:chExt cx="0" cy="0"/>
         </a:xfrm>
       </p:grpSpPr>
+      <p:pic>
+        <p:nvPicPr>
+          <p:cNvPr id="5" name="Imagem 4">
+            <a:extLst>
+              <a:ext uri="{FF2B5EF4-FFF2-40B4-BE49-F238E27FC236}">
+                <a16:creationId xmlns:a16="http://schemas.microsoft.com/office/drawing/2014/main" id="{D7E567C9-032C-36BA-C934-C95A1E85E286}"/>
+              </a:ext>
+            </a:extLst>
+          </p:cNvPr>
+          <p:cNvPicPr>
+            <a:picLocks noChangeAspect="1"/>
+          </p:cNvPicPr>
+          <p:nvPr/>
+        </p:nvPicPr>
+        <p:blipFill>
+          <a:blip r:embed="rId3">
+            <a:alphaModFix/>
+            <a:extLst>
+              <a:ext uri="{BEBA8EAE-BF5A-486C-A8C5-ECC9F3942E4B}">
+                <a14:imgProps xmlns:a14="http://schemas.microsoft.com/office/drawing/2010/main">
+                  <a14:imgLayer r:embed="rId4">
+                    <a14:imgEffect>
+                      <a14:saturation sat="110000"/>
+                    </a14:imgEffect>
+                  </a14:imgLayer>
+                </a14:imgProps>
+              </a:ext>
+            </a:extLst>
+          </a:blip>
+          <a:stretch>
+            <a:fillRect/>
+          </a:stretch>
+        </p:blipFill>
+        <p:spPr>
+          <a:xfrm>
+            <a:off x="-1" y="0"/>
+            <a:ext cx="12192000" cy="6858000"/>
+          </a:xfrm>
+          <a:prstGeom prst="rect">
+            <a:avLst/>
+          </a:prstGeom>
+          <a:effectLst>
+            <a:outerShdw blurRad="50800" dist="50800" dir="5400000" algn="ctr" rotWithShape="0">
+              <a:schemeClr val="accent4">
+                <a:lumMod val="75000"/>
+                <a:alpha val="0"/>
+              </a:schemeClr>
+            </a:outerShdw>
+            <a:softEdge rad="0"/>
+          </a:effectLst>
+        </p:spPr>
+      </p:pic>
       <p:sp>
         <p:nvSpPr>
           <p:cNvPr id="118" name="Google Shape;118;p2"/>
@@ -15713,8 +15318,8 @@
         </p:nvSpPr>
         <p:spPr>
           <a:xfrm>
-            <a:off x="838080" y="365040"/>
-            <a:ext cx="10514160" cy="1324080"/>
+            <a:off x="3537527" y="923636"/>
+            <a:ext cx="5126182" cy="1422400"/>
           </a:xfrm>
           <a:prstGeom prst="rect">
             <a:avLst/>
@@ -15730,7 +15335,7 @@
           </a:bodyPr>
           <a:lstStyle/>
           <a:p>
-            <a:pPr marL="0" marR="0" lvl="0" indent="0" algn="l" rtl="0">
+            <a:pPr marL="0" marR="0" lvl="0" indent="0" algn="ctr" rtl="0">
               <a:lnSpc>
                 <a:spcPct val="90000"/>
               </a:lnSpc>
@@ -15743,23 +15348,88 @@
               <a:buNone/>
             </a:pPr>
             <a:r>
-              <a:rPr lang="en-US" sz="4400" b="0" i="0" u="none" strike="noStrike" cap="none">
+              <a:rPr lang="en-US" sz="4400" b="0" i="0" u="none" strike="noStrike" cap="none" dirty="0" err="1">
                 <a:solidFill>
                   <a:srgbClr val="000000"/>
                 </a:solidFill>
-                <a:latin typeface="Calibri"/>
+                <a:latin typeface="Impact" panose="020B0806030902050204" pitchFamily="34" charset="0"/>
                 <a:ea typeface="Calibri"/>
                 <a:cs typeface="Calibri"/>
                 <a:sym typeface="Calibri"/>
               </a:rPr>
-              <a:t>Conceito do Jogo</a:t>
+              <a:t>Conceito</a:t>
             </a:r>
-            <a:endParaRPr sz="4400" b="0" i="0" u="none" strike="noStrike" cap="none">
-              <a:latin typeface="Arial"/>
-              <a:ea typeface="Arial"/>
-              <a:cs typeface="Arial"/>
+            <a:r>
+              <a:rPr lang="en-US" sz="4400" b="0" i="0" u="none" strike="noStrike" cap="none" dirty="0">
+                <a:solidFill>
+                  <a:srgbClr val="000000"/>
+                </a:solidFill>
+                <a:latin typeface="Impact" panose="020B0806030902050204" pitchFamily="34" charset="0"/>
+                <a:ea typeface="Calibri"/>
+                <a:cs typeface="Calibri"/>
+                <a:sym typeface="Calibri"/>
+              </a:rPr>
+              <a:t> do Jogo</a:t>
+            </a:r>
+            <a:endParaRPr sz="4400" b="0" i="0" u="none" strike="noStrike" cap="none" dirty="0">
+              <a:latin typeface="Impact" panose="020B0806030902050204" pitchFamily="34" charset="0"/>
               <a:sym typeface="Arial"/>
             </a:endParaRPr>
+          </a:p>
+        </p:txBody>
+      </p:sp>
+      <p:sp>
+        <p:nvSpPr>
+          <p:cNvPr id="7" name="Retângulo 6">
+            <a:extLst>
+              <a:ext uri="{FF2B5EF4-FFF2-40B4-BE49-F238E27FC236}">
+                <a16:creationId xmlns:a16="http://schemas.microsoft.com/office/drawing/2014/main" id="{15A550C0-17A6-C0E1-BD71-FF257B70AA8D}"/>
+              </a:ext>
+            </a:extLst>
+          </p:cNvPr>
+          <p:cNvSpPr/>
+          <p:nvPr/>
+        </p:nvSpPr>
+        <p:spPr>
+          <a:xfrm>
+            <a:off x="2176657" y="2466107"/>
+            <a:ext cx="7401451" cy="3740727"/>
+          </a:xfrm>
+          <a:prstGeom prst="rect">
+            <a:avLst/>
+          </a:prstGeom>
+          <a:solidFill>
+            <a:srgbClr val="29B3EF"/>
+          </a:solidFill>
+          <a:ln>
+            <a:solidFill>
+              <a:srgbClr val="595DD1"/>
+            </a:solidFill>
+          </a:ln>
+          <a:effectLst>
+            <a:softEdge rad="50800"/>
+          </a:effectLst>
+        </p:spPr>
+        <p:style>
+          <a:lnRef idx="2">
+            <a:schemeClr val="accent6"/>
+          </a:lnRef>
+          <a:fillRef idx="1">
+            <a:schemeClr val="lt1"/>
+          </a:fillRef>
+          <a:effectRef idx="0">
+            <a:schemeClr val="accent6"/>
+          </a:effectRef>
+          <a:fontRef idx="minor">
+            <a:schemeClr val="dk1"/>
+          </a:fontRef>
+        </p:style>
+        <p:txBody>
+          <a:bodyPr rtlCol="0" anchor="ctr"/>
+          <a:lstStyle/>
+          <a:p>
+            <a:pPr algn="ctr"/>
+            <a:endParaRPr lang="pt-BR"/>
           </a:p>
         </p:txBody>
       </p:sp>
@@ -15771,8 +15441,8 @@
         </p:nvSpPr>
         <p:spPr>
           <a:xfrm>
-            <a:off x="1677893" y="1689135"/>
-            <a:ext cx="10514100" cy="4350000"/>
+            <a:off x="2176658" y="2595419"/>
+            <a:ext cx="7660070" cy="3731486"/>
           </a:xfrm>
           <a:prstGeom prst="rect">
             <a:avLst/>
@@ -15788,7 +15458,7 @@
           </a:bodyPr>
           <a:lstStyle/>
           <a:p>
-            <a:pPr marL="228600" marR="0" lvl="0" indent="-227160" algn="l" rtl="0">
+            <a:pPr marL="228600" marR="0" lvl="0" indent="-227160" rtl="0">
               <a:lnSpc>
                 <a:spcPct val="90000"/>
               </a:lnSpc>
@@ -15806,11 +15476,11 @@
               <a:buChar char="•"/>
             </a:pPr>
             <a:r>
-              <a:rPr lang="pt-BR" sz="2800" b="0" i="0" u="none" strike="noStrike" cap="none" err="1">
+              <a:rPr lang="pt-BR" sz="2800" b="0" i="0" u="none" strike="noStrike" cap="none" dirty="0" err="1">
                 <a:solidFill>
                   <a:srgbClr val="000000"/>
                 </a:solidFill>
-                <a:latin typeface="Calibri"/>
+                <a:latin typeface="Bahnschrift Light" panose="020B0502040204020203" pitchFamily="34" charset="0"/>
                 <a:ea typeface="Calibri"/>
                 <a:cs typeface="Calibri"/>
                 <a:sym typeface="Calibri"/>
@@ -15818,26 +15488,36 @@
               <a:t>Shoot’em</a:t>
             </a:r>
             <a:r>
-              <a:rPr lang="pt-BR" sz="2800" b="0" i="0" u="none" strike="noStrike" cap="none">
+              <a:rPr lang="pt-BR" sz="2800" b="0" i="0" u="none" strike="noStrike" cap="none" dirty="0">
                 <a:solidFill>
                   <a:srgbClr val="000000"/>
                 </a:solidFill>
-                <a:latin typeface="Calibri"/>
+                <a:latin typeface="Bahnschrift Light" panose="020B0502040204020203" pitchFamily="34" charset="0"/>
                 <a:ea typeface="Calibri"/>
                 <a:cs typeface="Calibri"/>
                 <a:sym typeface="Calibri"/>
               </a:rPr>
-              <a:t> up</a:t>
+              <a:t> </a:t>
             </a:r>
-            <a:endParaRPr sz="2800" b="0" i="0" u="none" strike="noStrike" cap="none">
-              <a:latin typeface="Arial"/>
-              <a:ea typeface="Arial"/>
-              <a:cs typeface="Arial"/>
+            <a:r>
+              <a:rPr lang="pt-BR" sz="2800" b="0" i="0" u="none" strike="noStrike" cap="none" dirty="0" err="1">
+                <a:solidFill>
+                  <a:srgbClr val="000000"/>
+                </a:solidFill>
+                <a:latin typeface="Bahnschrift Light" panose="020B0502040204020203" pitchFamily="34" charset="0"/>
+                <a:ea typeface="Calibri"/>
+                <a:cs typeface="Calibri"/>
+                <a:sym typeface="Calibri"/>
+              </a:rPr>
+              <a:t>up</a:t>
+            </a:r>
+            <a:endParaRPr sz="2800" b="0" i="0" u="none" strike="noStrike" cap="none" dirty="0">
+              <a:latin typeface="Bahnschrift Light" panose="020B0502040204020203" pitchFamily="34" charset="0"/>
               <a:sym typeface="Arial"/>
             </a:endParaRPr>
           </a:p>
           <a:p>
-            <a:pPr marL="228600" marR="0" lvl="0" indent="-227160" algn="l" rtl="0">
+            <a:pPr marL="228600" marR="0" lvl="0" indent="-227160" rtl="0">
               <a:lnSpc>
                 <a:spcPct val="90000"/>
               </a:lnSpc>
@@ -15855,11 +15535,11 @@
               <a:buChar char="•"/>
             </a:pPr>
             <a:r>
-              <a:rPr lang="pt-BR" sz="2800" b="0" i="0" u="none" strike="noStrike" cap="none">
+              <a:rPr lang="pt-BR" sz="2800" b="0" i="0" u="none" strike="noStrike" cap="none" dirty="0">
                 <a:solidFill>
                   <a:srgbClr val="000000"/>
                 </a:solidFill>
-                <a:latin typeface="Calibri"/>
+                <a:latin typeface="Bahnschrift Light" panose="020B0502040204020203" pitchFamily="34" charset="0"/>
                 <a:ea typeface="Calibri"/>
                 <a:cs typeface="Calibri"/>
                 <a:sym typeface="Calibri"/>
@@ -15868,7 +15548,7 @@
             </a:r>
           </a:p>
           <a:p>
-            <a:pPr marL="228600" marR="0" lvl="0" indent="-227160" algn="l" rtl="0">
+            <a:pPr marL="228600" marR="0" lvl="0" indent="-227160" rtl="0">
               <a:lnSpc>
                 <a:spcPct val="90000"/>
               </a:lnSpc>
@@ -15886,30 +15566,38 @@
               <a:buChar char="•"/>
             </a:pPr>
             <a:r>
-              <a:rPr lang="pt-BR" sz="2800">
-                <a:latin typeface="Calibri"/>
+              <a:rPr lang="pt-BR" sz="2800" dirty="0">
+                <a:latin typeface="Bahnschrift Light" panose="020B0502040204020203" pitchFamily="34" charset="0"/>
                 <a:cs typeface="Calibri"/>
                 <a:sym typeface="Calibri"/>
               </a:rPr>
               <a:t>Atirar e eliminar os inimigos que aparecem na tela, ao mesmo tempo que é necessário desviar dos tiros inimigos e eventuais obstáculos que possam aparecer, coletar </a:t>
             </a:r>
             <a:r>
-              <a:rPr lang="pt-BR" sz="2800" err="1">
-                <a:latin typeface="Calibri"/>
+              <a:rPr lang="pt-BR" sz="2800" dirty="0" err="1">
+                <a:latin typeface="Bahnschrift Light" panose="020B0502040204020203" pitchFamily="34" charset="0"/>
                 <a:cs typeface="Calibri"/>
                 <a:sym typeface="Calibri"/>
               </a:rPr>
               <a:t>power-ups</a:t>
             </a:r>
             <a:r>
-              <a:rPr lang="pt-BR" sz="2800">
+              <a:rPr lang="pt-BR" sz="2800" dirty="0">
+                <a:latin typeface="Bahnschrift Light" panose="020B0502040204020203" pitchFamily="34" charset="0"/>
+                <a:cs typeface="Calibri"/>
+                <a:sym typeface="Calibri"/>
+              </a:rPr>
+              <a:t> para fortalecer o jogador e derrotar os chefes de fase </a:t>
+            </a:r>
+            <a:r>
+              <a:rPr lang="pt-BR" sz="2800" dirty="0">
                 <a:latin typeface="Calibri"/>
                 <a:cs typeface="Calibri"/>
                 <a:sym typeface="Calibri"/>
               </a:rPr>
-              <a:t> para fortalecer o jogador e derrotar os chefes de fase .</a:t>
+              <a:t>.</a:t>
             </a:r>
-            <a:endParaRPr lang="pt-BR" sz="2800" b="0" i="0" u="none" strike="noStrike" cap="none">
+            <a:endParaRPr lang="pt-BR" sz="2800" b="0" i="0" u="none" strike="noStrike" cap="none" dirty="0">
               <a:latin typeface="Arial"/>
               <a:ea typeface="Arial"/>
               <a:cs typeface="Arial"/>
@@ -15943,6 +15631,36 @@
           <a:chExt cx="0" cy="0"/>
         </a:xfrm>
       </p:grpSpPr>
+      <p:pic>
+        <p:nvPicPr>
+          <p:cNvPr id="3" name="Imagem 2">
+            <a:extLst>
+              <a:ext uri="{FF2B5EF4-FFF2-40B4-BE49-F238E27FC236}">
+                <a16:creationId xmlns:a16="http://schemas.microsoft.com/office/drawing/2014/main" id="{B3E27692-67E2-1D46-96EE-D7BA83D17540}"/>
+              </a:ext>
+            </a:extLst>
+          </p:cNvPr>
+          <p:cNvPicPr>
+            <a:picLocks noChangeAspect="1"/>
+          </p:cNvPicPr>
+          <p:nvPr/>
+        </p:nvPicPr>
+        <p:blipFill>
+          <a:blip r:embed="rId4"/>
+          <a:stretch>
+            <a:fillRect/>
+          </a:stretch>
+        </p:blipFill>
+        <p:spPr>
+          <a:xfrm>
+            <a:off x="0" y="0"/>
+            <a:ext cx="12192000" cy="6858000"/>
+          </a:xfrm>
+          <a:prstGeom prst="rect">
+            <a:avLst/>
+          </a:prstGeom>
+        </p:spPr>
+      </p:pic>
       <p:sp>
         <p:nvSpPr>
           <p:cNvPr id="124" name="Google Shape;124;p3"/>
@@ -16021,8 +15739,8 @@
         </p:nvSpPr>
         <p:spPr>
           <a:xfrm>
-            <a:off x="111760" y="682560"/>
-            <a:ext cx="11978640" cy="6084000"/>
+            <a:off x="544286" y="576942"/>
+            <a:ext cx="11546114" cy="5889171"/>
           </a:xfrm>
           <a:prstGeom prst="rect">
             <a:avLst/>
@@ -16050,7 +15768,7 @@
               </a:spcAft>
               <a:buNone/>
             </a:pPr>
-            <a:endParaRPr sz="1800" b="0" i="0" u="none" strike="noStrike" cap="none">
+            <a:endParaRPr sz="1800" b="0" i="0" u="none" strike="noStrike" cap="none" dirty="0">
               <a:latin typeface="Arial"/>
               <a:ea typeface="Arial"/>
               <a:cs typeface="Arial"/>
@@ -16070,7 +15788,7 @@
               <a:buChar char="•"/>
             </a:pPr>
             <a:r>
-              <a:rPr lang="pt-BR" sz="2300" b="0" i="0" u="none" strike="noStrike" cap="none">
+              <a:rPr lang="pt-BR" sz="2300" b="0" i="0" u="none" strike="noStrike" cap="none" dirty="0">
                 <a:solidFill>
                   <a:srgbClr val="000000"/>
                 </a:solidFill>
@@ -16082,7 +15800,7 @@
               <a:t>Há milhares de milhões de anos os deuses da criação decidiram criar um universo, porém queriam que toda a vida criada nesse universo não tivesse interferência deles mesmos, assim foi criado EVA, um planeta que em seu núcleo há a capacidade de criar vida. A partir de EVA foram criados diversos planetas e em cada planeta EVA criou uma biodiversidade única com seres únicos, criando assim todo o universo. Todos os seres criados inicialmente tinham o conhecimento de sua criação, porém com o passar do tempo e das gerações esse conhecimento foi-s</a:t>
             </a:r>
             <a:r>
-              <a:rPr lang="pt-BR" sz="2300">
+              <a:rPr lang="pt-BR" sz="2300" dirty="0">
                 <a:latin typeface="Calibri"/>
                 <a:ea typeface="Calibri"/>
                 <a:cs typeface="Calibri"/>
@@ -16090,7 +15808,7 @@
               </a:rPr>
               <a:t>e perdido, exceto no mundo onde tudo se originou. Milhares de anos após toda a criação os habitantes de EVA, seres mágicos com distintas habilidades que moravam em uma vila e se dedicavam  a proteger o mundo e toda a vida nele existente. Porém antes mesmo que pudessem reagir apareceu uma nave com um formato de serpente e prendeu a vila toda em um domo de energia que drenou grande parte de seus poderes e continuava a drenar pouco a pouco suas vidas e ao mesmo tempo toda a vida do planeta. Enquanto isso, um pouco longe da vila, estavam três jovens amigos que, durante uma discussão amigável, sentem que algo está diferente e que está acontecendo algo ruim, então decidem voltar para a vila voando em suas vassouras mágicas e se deparam com toda a situação de seu povo. Após conseguir dialogar com o pai de um deles que era o chefe da vila, partem em busca da fonte de tudo aquilo afim de libertar suas famílias e salvar todo o seu mundo.</a:t>
             </a:r>
-            <a:endParaRPr lang="pt-BR" sz="2300">
+            <a:endParaRPr lang="pt-BR" sz="2300" dirty="0">
               <a:latin typeface="Calibri"/>
               <a:ea typeface="Calibri"/>
               <a:cs typeface="Calibri"/>

</xml_diff>